<commit_message>
Subida luego del webinario
</commit_message>
<xml_diff>
--- a/workshop/Presentacion-2020-10-30.pptx
+++ b/workshop/Presentacion-2020-10-30.pptx
@@ -276,7 +276,7 @@
           <a:p>
             <a:fld id="{8461BF92-C1DC-40F1-B21F-1C8D6944B7EC}" type="datetimeFigureOut">
               <a:rPr lang="es-AR" smtClean="0"/>
-              <a:t>29/10/2020</a:t>
+              <a:t>30/10/2020</a:t>
             </a:fld>
             <a:endParaRPr lang="es-AR"/>
           </a:p>
@@ -476,7 +476,7 @@
           <a:p>
             <a:fld id="{8461BF92-C1DC-40F1-B21F-1C8D6944B7EC}" type="datetimeFigureOut">
               <a:rPr lang="es-AR" smtClean="0"/>
-              <a:t>29/10/2020</a:t>
+              <a:t>30/10/2020</a:t>
             </a:fld>
             <a:endParaRPr lang="es-AR"/>
           </a:p>
@@ -686,7 +686,7 @@
           <a:p>
             <a:fld id="{8461BF92-C1DC-40F1-B21F-1C8D6944B7EC}" type="datetimeFigureOut">
               <a:rPr lang="es-AR" smtClean="0"/>
-              <a:t>29/10/2020</a:t>
+              <a:t>30/10/2020</a:t>
             </a:fld>
             <a:endParaRPr lang="es-AR"/>
           </a:p>
@@ -916,7 +916,7 @@
           <a:p>
             <a:fld id="{8461BF92-C1DC-40F1-B21F-1C8D6944B7EC}" type="datetimeFigureOut">
               <a:rPr lang="es-AR" smtClean="0"/>
-              <a:t>29/10/2020</a:t>
+              <a:t>30/10/2020</a:t>
             </a:fld>
             <a:endParaRPr lang="es-AR"/>
           </a:p>
@@ -1228,7 +1228,7 @@
           <a:p>
             <a:fld id="{8461BF92-C1DC-40F1-B21F-1C8D6944B7EC}" type="datetimeFigureOut">
               <a:rPr lang="es-AR" smtClean="0"/>
-              <a:t>29/10/2020</a:t>
+              <a:t>30/10/2020</a:t>
             </a:fld>
             <a:endParaRPr lang="es-AR"/>
           </a:p>
@@ -1496,7 +1496,7 @@
           <a:p>
             <a:fld id="{8461BF92-C1DC-40F1-B21F-1C8D6944B7EC}" type="datetimeFigureOut">
               <a:rPr lang="es-AR" smtClean="0"/>
-              <a:t>29/10/2020</a:t>
+              <a:t>30/10/2020</a:t>
             </a:fld>
             <a:endParaRPr lang="es-AR"/>
           </a:p>
@@ -1911,7 +1911,7 @@
           <a:p>
             <a:fld id="{8461BF92-C1DC-40F1-B21F-1C8D6944B7EC}" type="datetimeFigureOut">
               <a:rPr lang="es-AR" smtClean="0"/>
-              <a:t>29/10/2020</a:t>
+              <a:t>30/10/2020</a:t>
             </a:fld>
             <a:endParaRPr lang="es-AR"/>
           </a:p>
@@ -2053,7 +2053,7 @@
           <a:p>
             <a:fld id="{8461BF92-C1DC-40F1-B21F-1C8D6944B7EC}" type="datetimeFigureOut">
               <a:rPr lang="es-AR" smtClean="0"/>
-              <a:t>29/10/2020</a:t>
+              <a:t>30/10/2020</a:t>
             </a:fld>
             <a:endParaRPr lang="es-AR"/>
           </a:p>
@@ -2166,7 +2166,7 @@
           <a:p>
             <a:fld id="{8461BF92-C1DC-40F1-B21F-1C8D6944B7EC}" type="datetimeFigureOut">
               <a:rPr lang="es-AR" smtClean="0"/>
-              <a:t>29/10/2020</a:t>
+              <a:t>30/10/2020</a:t>
             </a:fld>
             <a:endParaRPr lang="es-AR"/>
           </a:p>
@@ -2479,7 +2479,7 @@
           <a:p>
             <a:fld id="{8461BF92-C1DC-40F1-B21F-1C8D6944B7EC}" type="datetimeFigureOut">
               <a:rPr lang="es-AR" smtClean="0"/>
-              <a:t>29/10/2020</a:t>
+              <a:t>30/10/2020</a:t>
             </a:fld>
             <a:endParaRPr lang="es-AR"/>
           </a:p>
@@ -2768,7 +2768,7 @@
           <a:p>
             <a:fld id="{8461BF92-C1DC-40F1-B21F-1C8D6944B7EC}" type="datetimeFigureOut">
               <a:rPr lang="es-AR" smtClean="0"/>
-              <a:t>29/10/2020</a:t>
+              <a:t>30/10/2020</a:t>
             </a:fld>
             <a:endParaRPr lang="es-AR"/>
           </a:p>
@@ -3011,7 +3011,7 @@
           <a:p>
             <a:fld id="{8461BF92-C1DC-40F1-B21F-1C8D6944B7EC}" type="datetimeFigureOut">
               <a:rPr lang="es-AR" smtClean="0"/>
-              <a:t>29/10/2020</a:t>
+              <a:t>30/10/2020</a:t>
             </a:fld>
             <a:endParaRPr lang="es-AR"/>
           </a:p>
@@ -6217,13 +6217,13 @@
         </p:nvSpPr>
         <p:spPr>
           <a:xfrm>
-            <a:off x="838200" y="1241571"/>
-            <a:ext cx="10515600" cy="5352176"/>
+            <a:off x="838200" y="1661020"/>
+            <a:ext cx="10515600" cy="4546833"/>
           </a:xfrm>
         </p:spPr>
         <p:txBody>
           <a:bodyPr>
-            <a:normAutofit lnSpcReduction="10000"/>
+            <a:normAutofit/>
           </a:bodyPr>
           <a:lstStyle/>
           <a:p>
@@ -6347,40 +6347,6 @@
                 </a:solidFill>
               </a:rPr>
               <a:t>Ejercicio individual o grupal, preguntas y respuestas (30 minutos)</a:t>
-            </a:r>
-          </a:p>
-          <a:p>
-            <a:pPr lvl="2">
-              <a:spcBef>
-                <a:spcPts val="2000"/>
-              </a:spcBef>
-            </a:pPr>
-            <a:r>
-              <a:rPr lang="es-ES" dirty="0">
-                <a:solidFill>
-                  <a:schemeClr val="bg1">
-                    <a:lumMod val="50000"/>
-                  </a:schemeClr>
-                </a:solidFill>
-              </a:rPr>
-              <a:t>Grupo de R</a:t>
-            </a:r>
-          </a:p>
-          <a:p>
-            <a:pPr lvl="2">
-              <a:spcBef>
-                <a:spcPts val="2000"/>
-              </a:spcBef>
-            </a:pPr>
-            <a:r>
-              <a:rPr lang="es-ES" dirty="0">
-                <a:solidFill>
-                  <a:schemeClr val="bg1">
-                    <a:lumMod val="50000"/>
-                  </a:schemeClr>
-                </a:solidFill>
-              </a:rPr>
-              <a:t>Grupo de Python</a:t>
             </a:r>
           </a:p>
           <a:p>
@@ -6657,68 +6623,6 @@
                                           <p:spTgt spid="3">
                                             <p:txEl>
                                               <p:pRg st="7" end="7"/>
-                                            </p:txEl>
-                                          </p:spTgt>
-                                        </p:tgtEl>
-                                        <p:attrNameLst>
-                                          <p:attrName>style.visibility</p:attrName>
-                                        </p:attrNameLst>
-                                      </p:cBhvr>
-                                      <p:to>
-                                        <p:strVal val="visible"/>
-                                      </p:to>
-                                    </p:set>
-                                  </p:childTnLst>
-                                </p:cTn>
-                              </p:par>
-                              <p:par>
-                                <p:cTn id="21" presetID="1" presetClass="entr" presetSubtype="0" fill="hold" nodeType="withEffect">
-                                  <p:stCondLst>
-                                    <p:cond delay="0"/>
-                                  </p:stCondLst>
-                                  <p:childTnLst>
-                                    <p:set>
-                                      <p:cBhvr>
-                                        <p:cTn id="22" dur="1" fill="hold">
-                                          <p:stCondLst>
-                                            <p:cond delay="0"/>
-                                          </p:stCondLst>
-                                        </p:cTn>
-                                        <p:tgtEl>
-                                          <p:spTgt spid="3">
-                                            <p:txEl>
-                                              <p:pRg st="8" end="8"/>
-                                            </p:txEl>
-                                          </p:spTgt>
-                                        </p:tgtEl>
-                                        <p:attrNameLst>
-                                          <p:attrName>style.visibility</p:attrName>
-                                        </p:attrNameLst>
-                                      </p:cBhvr>
-                                      <p:to>
-                                        <p:strVal val="visible"/>
-                                      </p:to>
-                                    </p:set>
-                                  </p:childTnLst>
-                                </p:cTn>
-                              </p:par>
-                              <p:par>
-                                <p:cTn id="23" presetID="1" presetClass="entr" presetSubtype="0" fill="hold" nodeType="withEffect">
-                                  <p:stCondLst>
-                                    <p:cond delay="0"/>
-                                  </p:stCondLst>
-                                  <p:childTnLst>
-                                    <p:set>
-                                      <p:cBhvr>
-                                        <p:cTn id="24" dur="1" fill="hold">
-                                          <p:stCondLst>
-                                            <p:cond delay="0"/>
-                                          </p:stCondLst>
-                                        </p:cTn>
-                                        <p:tgtEl>
-                                          <p:spTgt spid="3">
-                                            <p:txEl>
-                                              <p:pRg st="9" end="9"/>
                                             </p:txEl>
                                           </p:spTgt>
                                         </p:tgtEl>

</xml_diff>